<commit_message>
Fixed a bug in the PI of F3p_li_ds.incCntrBy1GetVal().
</commit_message>
<xml_diff>
--- a/Cntrs seminar NextSilicon.pptx
+++ b/Cntrs seminar NextSilicon.pptx
@@ -345,7 +345,7 @@
               <a:pPr>
                 <a:defRPr/>
               </a:pPr>
-              <a:t>8/21/2024</a:t>
+              <a:t>8/22/2024</a:t>
             </a:fld>
             <a:endParaRPr lang="en-US"/>
           </a:p>
@@ -604,7 +604,7 @@
               <a:pPr>
                 <a:defRPr/>
               </a:pPr>
-              <a:t>8/21/2024</a:t>
+              <a:t>8/22/2024</a:t>
             </a:fld>
             <a:endParaRPr lang="en-US"/>
           </a:p>
@@ -13371,8 +13371,8 @@
           </a:graphicData>
         </a:graphic>
       </p:graphicFrame>
-      <mc:AlternateContent xmlns:mc="http://schemas.openxmlformats.org/markup-compatibility/2006" xmlns:a14="http://schemas.microsoft.com/office/drawing/2010/main">
-        <mc:Choice Requires="a14">
+      <mc:AlternateContent xmlns:mc="http://schemas.openxmlformats.org/markup-compatibility/2006">
+        <mc:Choice xmlns:a14="http://schemas.microsoft.com/office/drawing/2010/main" Requires="a14">
           <p:sp>
             <p:nvSpPr>
               <p:cNvPr id="2" name="Content Placeholder 12">
@@ -13619,6 +13619,20 @@
                 </a:r>
               </a:p>
               <a:p>
+                <a:r>
+                  <a:rPr lang="en-US" b="0" kern="0" dirty="0">
+                    <a:solidFill>
+                      <a:srgbClr val="FF0000"/>
+                    </a:solidFill>
+                  </a:rPr>
+                  <a:t>EXPLAIN HERE what it is</a:t>
+                </a:r>
+              </a:p>
+              <a:p>
+                <a:pPr lvl="1"/>
+                <a:endParaRPr lang="en-US" b="0" kern="0" dirty="0"/>
+              </a:p>
+              <a:p>
                 <a:pPr lvl="2"/>
                 <a:endParaRPr lang="en-US" b="0" kern="0" dirty="0"/>
               </a:p>
@@ -13641,7 +13655,7 @@
             </p:txBody>
           </p:sp>
         </mc:Choice>
-        <mc:Fallback xmlns="">
+        <mc:Fallback>
           <p:sp>
             <p:nvSpPr>
               <p:cNvPr id="2" name="Content Placeholder 12">
@@ -36805,22 +36819,28 @@
             </a:r>
           </a:p>
           <a:p>
+            <a:pPr lvl="1">
+              <a:buFont typeface="Wingdings" panose="05000000000000000000" pitchFamily="2" charset="2"/>
+              <a:buChar char="J"/>
+            </a:pPr>
+            <a:r>
+              <a:rPr lang="en-US" dirty="0"/>
+              <a:t>May be amortized</a:t>
+            </a:r>
+          </a:p>
+          <a:p>
             <a:pPr marL="457200" lvl="1" indent="0">
               <a:buNone/>
             </a:pPr>
             <a:r>
-              <a:rPr lang="en-US" b="1" dirty="0">
-                <a:solidFill>
-                  <a:srgbClr val="00FF00"/>
-                </a:solidFill>
-                <a:sym typeface="Wingdings" pitchFamily="2" charset="2"/>
+              <a:rPr lang="en-US" sz="2800" b="1" dirty="0">
+                <a:solidFill>
+                  <a:srgbClr val="FF0000"/>
+                </a:solidFill>
               </a:rPr>
-              <a:t> </a:t>
-            </a:r>
-            <a:r>
-              <a:rPr lang="en-US" dirty="0"/>
-              <a:t>May be amortized</a:t>
-            </a:r>
+              <a:t>Detail the up-scaling here</a:t>
+            </a:r>
+            <a:endParaRPr lang="en-US" b="1" dirty="0"/>
           </a:p>
         </p:txBody>
       </p:sp>
@@ -38313,6 +38333,17 @@
               <a:rPr lang="en-US" sz="3400" dirty="0"/>
               <a:t>Dynamic Scaling using buckets</a:t>
             </a:r>
+            <a:br>
+              <a:rPr lang="en-US" sz="3400" dirty="0"/>
+            </a:br>
+            <a:r>
+              <a:rPr lang="en-US" sz="3400" dirty="0">
+                <a:solidFill>
+                  <a:srgbClr val="FF0000"/>
+                </a:solidFill>
+              </a:rPr>
+              <a:t>Detail the up-scaling here</a:t>
+            </a:r>
           </a:p>
         </p:txBody>
       </p:sp>
@@ -39223,6 +39254,25 @@
               <a:rPr lang="en-US" sz="3400" dirty="0"/>
               <a:t>Scalable Exponent Counters</a:t>
             </a:r>
+            <a:br>
+              <a:rPr lang="en-US" sz="3400" dirty="0"/>
+            </a:br>
+            <a:r>
+              <a:rPr lang="en-US" sz="3400" dirty="0"/>
+              <a:t>Dynamic Scaling using buckets</a:t>
+            </a:r>
+            <a:br>
+              <a:rPr lang="en-US" sz="3400" dirty="0"/>
+            </a:br>
+            <a:r>
+              <a:rPr lang="en-US" sz="3400" dirty="0">
+                <a:solidFill>
+                  <a:srgbClr val="FF0000"/>
+                </a:solidFill>
+              </a:rPr>
+              <a:t>Detail the up-scaling here</a:t>
+            </a:r>
+            <a:endParaRPr lang="en-US" sz="3400" dirty="0"/>
           </a:p>
         </p:txBody>
       </p:sp>
@@ -44413,23 +44463,6 @@
           <a:p>
             <a:r>
               <a:rPr lang="en-US" dirty="0"/>
-              <a:t>U</a:t>
-            </a:r>
-            <a:r>
-              <a:rPr lang="en-GB" dirty="0"/>
-              <a:t>se</a:t>
-            </a:r>
-            <a:r>
-              <a:rPr lang="en-US" dirty="0"/>
-              <a:t> probabilistic increments</a:t>
-            </a:r>
-          </a:p>
-          <a:p>
-            <a:endParaRPr lang="en-US" dirty="0"/>
-          </a:p>
-          <a:p>
-            <a:r>
-              <a:rPr lang="en-US" dirty="0"/>
               <a:t>Share counters of similar colors</a:t>
             </a:r>
           </a:p>
@@ -44439,6 +44472,20 @@
               <a:rPr lang="en-US" dirty="0"/>
               <a:t>Aka “hashing”</a:t>
             </a:r>
+          </a:p>
+          <a:p>
+            <a:pPr lvl="1"/>
+            <a:endParaRPr lang="en-US" dirty="0"/>
+          </a:p>
+          <a:p>
+            <a:r>
+              <a:rPr lang="en-US" dirty="0"/>
+              <a:t>Approximate</a:t>
+            </a:r>
+          </a:p>
+          <a:p>
+            <a:pPr lvl="1"/>
+            <a:endParaRPr lang="en-US" dirty="0"/>
           </a:p>
           <a:p>
             <a:endParaRPr lang="en-US" dirty="0"/>
@@ -45287,7 +45334,7 @@
                                         <p:tgtEl>
                                           <p:spTgt spid="5">
                                             <p:txEl>
-                                              <p:pRg st="5" end="5"/>
+                                              <p:pRg st="3" end="3"/>
                                             </p:txEl>
                                           </p:spTgt>
                                         </p:tgtEl>
@@ -45464,6 +45511,55 @@
                                     <p:set>
                                       <p:cBhvr>
                                         <p:cTn id="20" dur="1" fill="hold">
+                                          <p:stCondLst>
+                                            <p:cond delay="0"/>
+                                          </p:stCondLst>
+                                        </p:cTn>
+                                        <p:tgtEl>
+                                          <p:spTgt spid="5">
+                                            <p:txEl>
+                                              <p:pRg st="4" end="4"/>
+                                            </p:txEl>
+                                          </p:spTgt>
+                                        </p:tgtEl>
+                                        <p:attrNameLst>
+                                          <p:attrName>style.visibility</p:attrName>
+                                        </p:attrNameLst>
+                                      </p:cBhvr>
+                                      <p:to>
+                                        <p:strVal val="visible"/>
+                                      </p:to>
+                                    </p:set>
+                                  </p:childTnLst>
+                                </p:cTn>
+                              </p:par>
+                            </p:childTnLst>
+                          </p:cTn>
+                        </p:par>
+                      </p:childTnLst>
+                    </p:cTn>
+                  </p:par>
+                  <p:par>
+                    <p:cTn id="21" fill="hold">
+                      <p:stCondLst>
+                        <p:cond delay="indefinite"/>
+                      </p:stCondLst>
+                      <p:childTnLst>
+                        <p:par>
+                          <p:cTn id="22" fill="hold">
+                            <p:stCondLst>
+                              <p:cond delay="0"/>
+                            </p:stCondLst>
+                            <p:childTnLst>
+                              <p:par>
+                                <p:cTn id="23" presetID="1" presetClass="entr" presetSubtype="0" fill="hold" nodeType="clickEffect">
+                                  <p:stCondLst>
+                                    <p:cond delay="0"/>
+                                  </p:stCondLst>
+                                  <p:childTnLst>
+                                    <p:set>
+                                      <p:cBhvr>
+                                        <p:cTn id="24" dur="1" fill="hold">
                                           <p:stCondLst>
                                             <p:cond delay="0"/>
                                           </p:stCondLst>

</xml_diff>